<commit_message>
moved resource for creating/updating policy
Previously for creating a policy a POST request was sent to
`/nffgs/{nffg_name}/policies`.

Now a PUT request is sent to `policies/{policy_name}`

PUT is idempotent, POST is not. Since policies should be replaced if
have the same name, PUT is appropriate, also because the path is chosen
by the client (corresponds to the name of the policy)
</commit_message>
<xml_diff>
--- a/Assignment_3/doc-files/resources_chart.pptx
+++ b/Assignment_3/doc-files/resources_chart.pptx
@@ -1702,7 +1702,7 @@
         <a:p>
           <a:r>
             <a:rPr lang="it-IT" dirty="0"/>
-            <a:t>GET, DELETE</a:t>
+            <a:t>GET, PUT, DELETE</a:t>
           </a:r>
         </a:p>
       </dgm:t>
@@ -1834,7 +1834,7 @@
         <a:p>
           <a:r>
             <a:rPr lang="it-IT" dirty="0"/>
-            <a:t>GET, POST</a:t>
+            <a:t>GET</a:t>
           </a:r>
         </a:p>
       </dgm:t>
@@ -6375,7 +6375,7 @@
           </a:pPr>
           <a:r>
             <a:rPr lang="it-IT" sz="1100" kern="1200" dirty="0"/>
-            <a:t>GET, POST</a:t>
+            <a:t>GET</a:t>
           </a:r>
         </a:p>
       </dsp:txBody>
@@ -6808,12 +6808,12 @@
         <a:fontRef idx="minor"/>
       </dsp:style>
       <dsp:txBody>
-        <a:bodyPr spcFirstLastPara="0" vert="horz" wrap="square" lIns="27940" tIns="6985" rIns="27940" bIns="6985" numCol="1" spcCol="1270" anchor="ctr" anchorCtr="0">
+        <a:bodyPr spcFirstLastPara="0" vert="horz" wrap="square" lIns="22860" tIns="5715" rIns="22860" bIns="5715" numCol="1" spcCol="1270" anchor="ctr" anchorCtr="0">
           <a:noAutofit/>
         </a:bodyPr>
         <a:lstStyle/>
         <a:p>
-          <a:pPr marL="0" lvl="0" indent="0" algn="r" defTabSz="488950">
+          <a:pPr marL="0" lvl="0" indent="0" algn="r" defTabSz="400050">
             <a:lnSpc>
               <a:spcPct val="90000"/>
             </a:lnSpc>
@@ -6826,8 +6826,8 @@
             <a:buNone/>
           </a:pPr>
           <a:r>
-            <a:rPr lang="it-IT" sz="1100" kern="1200" dirty="0"/>
-            <a:t>GET, DELETE</a:t>
+            <a:rPr lang="it-IT" sz="900" kern="1200" dirty="0"/>
+            <a:t>GET, PUT, DELETE</a:t>
           </a:r>
         </a:p>
       </dsp:txBody>
@@ -11224,7 +11224,7 @@
           <a:p>
             <a:fld id="{0EF26048-D2AB-4E61-A93B-749FDB24D3A5}" type="datetimeFigureOut">
               <a:rPr lang="it-IT" smtClean="0"/>
-              <a:t>06/01/2017</a:t>
+              <a:t>07/01/2017</a:t>
             </a:fld>
             <a:endParaRPr lang="it-IT"/>
           </a:p>
@@ -11392,7 +11392,7 @@
           <a:p>
             <a:fld id="{0EF26048-D2AB-4E61-A93B-749FDB24D3A5}" type="datetimeFigureOut">
               <a:rPr lang="it-IT" smtClean="0"/>
-              <a:t>06/01/2017</a:t>
+              <a:t>07/01/2017</a:t>
             </a:fld>
             <a:endParaRPr lang="it-IT"/>
           </a:p>
@@ -11570,7 +11570,7 @@
           <a:p>
             <a:fld id="{0EF26048-D2AB-4E61-A93B-749FDB24D3A5}" type="datetimeFigureOut">
               <a:rPr lang="it-IT" smtClean="0"/>
-              <a:t>06/01/2017</a:t>
+              <a:t>07/01/2017</a:t>
             </a:fld>
             <a:endParaRPr lang="it-IT"/>
           </a:p>
@@ -11738,7 +11738,7 @@
           <a:p>
             <a:fld id="{0EF26048-D2AB-4E61-A93B-749FDB24D3A5}" type="datetimeFigureOut">
               <a:rPr lang="it-IT" smtClean="0"/>
-              <a:t>06/01/2017</a:t>
+              <a:t>07/01/2017</a:t>
             </a:fld>
             <a:endParaRPr lang="it-IT"/>
           </a:p>
@@ -11983,7 +11983,7 @@
           <a:p>
             <a:fld id="{0EF26048-D2AB-4E61-A93B-749FDB24D3A5}" type="datetimeFigureOut">
               <a:rPr lang="it-IT" smtClean="0"/>
-              <a:t>06/01/2017</a:t>
+              <a:t>07/01/2017</a:t>
             </a:fld>
             <a:endParaRPr lang="it-IT"/>
           </a:p>
@@ -12212,7 +12212,7 @@
           <a:p>
             <a:fld id="{0EF26048-D2AB-4E61-A93B-749FDB24D3A5}" type="datetimeFigureOut">
               <a:rPr lang="it-IT" smtClean="0"/>
-              <a:t>06/01/2017</a:t>
+              <a:t>07/01/2017</a:t>
             </a:fld>
             <a:endParaRPr lang="it-IT"/>
           </a:p>
@@ -12576,7 +12576,7 @@
           <a:p>
             <a:fld id="{0EF26048-D2AB-4E61-A93B-749FDB24D3A5}" type="datetimeFigureOut">
               <a:rPr lang="it-IT" smtClean="0"/>
-              <a:t>06/01/2017</a:t>
+              <a:t>07/01/2017</a:t>
             </a:fld>
             <a:endParaRPr lang="it-IT"/>
           </a:p>
@@ -12693,7 +12693,7 @@
           <a:p>
             <a:fld id="{0EF26048-D2AB-4E61-A93B-749FDB24D3A5}" type="datetimeFigureOut">
               <a:rPr lang="it-IT" smtClean="0"/>
-              <a:t>06/01/2017</a:t>
+              <a:t>07/01/2017</a:t>
             </a:fld>
             <a:endParaRPr lang="it-IT"/>
           </a:p>
@@ -12788,7 +12788,7 @@
           <a:p>
             <a:fld id="{0EF26048-D2AB-4E61-A93B-749FDB24D3A5}" type="datetimeFigureOut">
               <a:rPr lang="it-IT" smtClean="0"/>
-              <a:t>06/01/2017</a:t>
+              <a:t>07/01/2017</a:t>
             </a:fld>
             <a:endParaRPr lang="it-IT"/>
           </a:p>
@@ -13063,7 +13063,7 @@
           <a:p>
             <a:fld id="{0EF26048-D2AB-4E61-A93B-749FDB24D3A5}" type="datetimeFigureOut">
               <a:rPr lang="it-IT" smtClean="0"/>
-              <a:t>06/01/2017</a:t>
+              <a:t>07/01/2017</a:t>
             </a:fld>
             <a:endParaRPr lang="it-IT"/>
           </a:p>
@@ -13315,7 +13315,7 @@
           <a:p>
             <a:fld id="{0EF26048-D2AB-4E61-A93B-749FDB24D3A5}" type="datetimeFigureOut">
               <a:rPr lang="it-IT" smtClean="0"/>
-              <a:t>06/01/2017</a:t>
+              <a:t>07/01/2017</a:t>
             </a:fld>
             <a:endParaRPr lang="it-IT"/>
           </a:p>
@@ -13526,7 +13526,7 @@
           <a:p>
             <a:fld id="{0EF26048-D2AB-4E61-A93B-749FDB24D3A5}" type="datetimeFigureOut">
               <a:rPr lang="it-IT" smtClean="0"/>
-              <a:t>06/01/2017</a:t>
+              <a:t>07/01/2017</a:t>
             </a:fld>
             <a:endParaRPr lang="it-IT"/>
           </a:p>
@@ -13938,7 +13938,7 @@
           <p:nvPr>
             <p:extLst>
               <p:ext uri="{D42A27DB-BD31-4B8C-83A1-F6EECF244321}">
-                <p14:modId xmlns:p14="http://schemas.microsoft.com/office/powerpoint/2010/main" val="2503388205"/>
+                <p14:modId xmlns:p14="http://schemas.microsoft.com/office/powerpoint/2010/main" val="2622184391"/>
               </p:ext>
             </p:extLst>
           </p:nvPr>
@@ -14314,19 +14314,19 @@
 
 <file path=customXml/item1.xml><?xml version="1.0" encoding="utf-8"?>
 <Control xmlns="http://schemas.microsoft.com/VisualStudio/2011/storyboarding/control">
-  <Id Name="System.Storyboarding.Backgrounds.Window" Revision="1" Stencil="System.Storyboarding.Backgrounds" StencilVersion="0.1"/>
+  <Id Name="System.Storyboarding.Common.Text" Revision="1" Stencil="System.Storyboarding.Common" StencilVersion="0.1"/>
 </Control>
 </file>
 
 <file path=customXml/item10.xml><?xml version="1.0" encoding="utf-8"?>
 <Control xmlns="http://schemas.microsoft.com/VisualStudio/2011/storyboarding/control">
-  <Id Name="System.Storyboarding.WindowsApps.WindowsAppsToggleOn" Revision="1" Stencil="System.Storyboarding.WindowsApps" StencilVersion="0.1"/>
+  <Id Name="System.Storyboarding.WindowsDesktop.FileMenu" Revision="1" Stencil="System.Storyboarding.WindowsDesktop" StencilVersion="0.1"/>
 </Control>
 </file>
 
 <file path=customXml/item11.xml><?xml version="1.0" encoding="utf-8"?>
 <Control xmlns="http://schemas.microsoft.com/VisualStudio/2011/storyboarding/control">
-  <Id Name="1b307ca5-99e5-449b-8ef2-a0428414e9db" RevisionId="2622a26d-297d-4017-9079-e942319ca707" Stencil="172d6d98-e5c9-42e9-a209-79f7a94bbd38" StencilRevisionId="00000000-0000-0000-0000-000000000000" StencilVersion="0.0"/>
+  <Id Name="System.Storyboarding.Backgrounds.DesktopTaskbar" Revision="1" Stencil="System.Storyboarding.Backgrounds" StencilVersion="0.1"/>
 </Control>
 </file>
 
@@ -14338,13 +14338,13 @@
 
 <file path=customXml/item13.xml><?xml version="1.0" encoding="utf-8"?>
 <Control xmlns="http://schemas.microsoft.com/VisualStudio/2011/storyboarding/control">
-  <Id Name="System.Storyboarding.WindowsApps.WindowsAppsProgressRing" Revision="1" Stencil="System.Storyboarding.WindowsApps" StencilVersion="0.1"/>
+  <Id Name="System.Storyboarding.WindowsPhone.Notification" Revision="1" Stencil="System.Storyboarding.WindowsPhone" StencilVersion="0.1"/>
 </Control>
 </file>
 
 <file path=customXml/item14.xml><?xml version="1.0" encoding="utf-8"?>
 <Control xmlns="http://schemas.microsoft.com/VisualStudio/2011/storyboarding/control">
-  <Id Name="System.Storyboarding.WindowsPhone.Notification" Revision="1" Stencil="System.Storyboarding.WindowsPhone" StencilVersion="0.1"/>
+  <Id Name="System.Storyboarding.Common.Text" Revision="1" Stencil="System.Storyboarding.Common" StencilVersion="0.1"/>
 </Control>
 </file>
 
@@ -14356,79 +14356,79 @@
 
 <file path=customXml/item16.xml><?xml version="1.0" encoding="utf-8"?>
 <Control xmlns="http://schemas.microsoft.com/VisualStudio/2011/storyboarding/control">
-  <Id Name="System.Storyboarding.WindowsApps.WindowsAppsProgressBar" Revision="1" Stencil="System.Storyboarding.WindowsApps" StencilVersion="0.1"/>
+  <Id Name="System.Storyboarding.WindowsApps.WindowsAppsProgressRing" Revision="1" Stencil="System.Storyboarding.WindowsApps" StencilVersion="0.1"/>
 </Control>
 </file>
 
 <file path=customXml/item17.xml><?xml version="1.0" encoding="utf-8"?>
 <Control xmlns="http://schemas.microsoft.com/VisualStudio/2011/storyboarding/control">
-  <Id Name="System.Storyboarding.WindowsApps.Share" Revision="1" Stencil="System.Storyboarding.WindowsApps" StencilVersion="0.1"/>
+  <Id Name="System.Storyboarding.Backgrounds.WindowsPhoneLandscape" Revision="1" Stencil="System.Storyboarding.Backgrounds" StencilVersion="0.1"/>
 </Control>
 </file>
 
 <file path=customXml/item18.xml><?xml version="1.0" encoding="utf-8"?>
 <Control xmlns="http://schemas.microsoft.com/VisualStudio/2011/storyboarding/control">
-  <Id Name="System.Storyboarding.Backgrounds.WindowsPhoneLandscape" Revision="1" Stencil="System.Storyboarding.Backgrounds" StencilVersion="0.1"/>
+  <Id Name="System.Storyboarding.WindowsDesktop.AlertDialog" Revision="1" Stencil="System.Storyboarding.WindowsDesktop" StencilVersion="0.1"/>
 </Control>
 </file>
 
 <file path=customXml/item19.xml><?xml version="1.0" encoding="utf-8"?>
 <Control xmlns="http://schemas.microsoft.com/VisualStudio/2011/storyboarding/control">
-  <Id Name="System.Storyboarding.WindowsDesktop.FileMenu" Revision="1" Stencil="System.Storyboarding.WindowsDesktop" StencilVersion="0.1"/>
+  <Id Name="System.Storyboarding.WindowsApps.WindowsAppsKeyboard" Revision="1" Stencil="System.Storyboarding.WindowsApps" StencilVersion="0.1"/>
 </Control>
 </file>
 
 <file path=customXml/item2.xml><?xml version="1.0" encoding="utf-8"?>
 <Control xmlns="http://schemas.microsoft.com/VisualStudio/2011/storyboarding/control">
-  <Id Name="System.Storyboarding.Common.Text" Revision="1" Stencil="System.Storyboarding.Common" StencilVersion="0.1"/>
+  <Id Name="System.Storyboarding.WindowsApps.WindowsAppsProgressBar" Revision="1" Stencil="System.Storyboarding.WindowsApps" StencilVersion="0.1"/>
 </Control>
 </file>
 
 <file path=customXml/item20.xml><?xml version="1.0" encoding="utf-8"?>
 <Control xmlns="http://schemas.microsoft.com/VisualStudio/2011/storyboarding/control">
-  <Id Name="System.Storyboarding.Common.Text" Revision="1" Stencil="System.Storyboarding.Common" StencilVersion="0.1"/>
+  <Id Name="System.Storyboarding.WindowsAppIcons.Calculator" Revision="1" Stencil="System.Storyboarding.WindowsAppIcons" StencilVersion="0.1"/>
 </Control>
 </file>
 
 <file path=customXml/item21.xml><?xml version="1.0" encoding="utf-8"?>
 <Control xmlns="http://schemas.microsoft.com/VisualStudio/2011/storyboarding/control">
-  <Id Name="System.Storyboarding.WindowsApps.WindowsAppsKeyboard" Revision="1" Stencil="System.Storyboarding.WindowsApps" StencilVersion="0.1"/>
+  <Id Name="System.Storyboarding.Common.Text" Revision="1" Stencil="System.Storyboarding.Common" StencilVersion="0.1"/>
 </Control>
 </file>
 
 <file path=customXml/item22.xml><?xml version="1.0" encoding="utf-8"?>
 <Control xmlns="http://schemas.microsoft.com/VisualStudio/2011/storyboarding/control">
-  <Id Name="System.Storyboarding.Common.Text" Revision="1" Stencil="System.Storyboarding.Common" StencilVersion="0.1"/>
+  <Id Name="System.Storyboarding.WindowsApps.Share" Revision="1" Stencil="System.Storyboarding.WindowsApps" StencilVersion="0.1"/>
 </Control>
 </file>
 
 <file path=customXml/item3.xml><?xml version="1.0" encoding="utf-8"?>
 <Control xmlns="http://schemas.microsoft.com/VisualStudio/2011/storyboarding/control">
-  <Id Name="System.Storyboarding.WindowsDesktop.AlertDialog" Revision="1" Stencil="System.Storyboarding.WindowsDesktop" StencilVersion="0.1"/>
+  <Id Name="System.Storyboarding.Common.Text" Revision="1" Stencil="System.Storyboarding.Common" StencilVersion="0.1"/>
 </Control>
 </file>
 
 <file path=customXml/item4.xml><?xml version="1.0" encoding="utf-8"?>
 <Control xmlns="http://schemas.microsoft.com/VisualStudio/2011/storyboarding/control">
-  <Id Name="System.Storyboarding.Backgrounds.DesktopTaskbar" Revision="1" Stencil="System.Storyboarding.Backgrounds" StencilVersion="0.1"/>
+  <Id Name="System.Storyboarding.Backgrounds.Window" Revision="1" Stencil="System.Storyboarding.Backgrounds" StencilVersion="0.1"/>
 </Control>
 </file>
 
 <file path=customXml/item5.xml><?xml version="1.0" encoding="utf-8"?>
 <Control xmlns="http://schemas.microsoft.com/VisualStudio/2011/storyboarding/control">
-  <Id Name="System.Storyboarding.Common.Text" Revision="1" Stencil="System.Storyboarding.Common" StencilVersion="0.1"/>
+  <Id Name="System.Storyboarding.WindowsApps.CharmBar" Revision="1" Stencil="System.Storyboarding.WindowsApps" StencilVersion="0.1"/>
 </Control>
 </file>
 
 <file path=customXml/item6.xml><?xml version="1.0" encoding="utf-8"?>
 <Control xmlns="http://schemas.microsoft.com/VisualStudio/2011/storyboarding/control">
-  <Id Name="System.Storyboarding.WindowsApps.CharmBar" Revision="1" Stencil="System.Storyboarding.WindowsApps" StencilVersion="0.1"/>
+  <Id Name="1b307ca5-99e5-449b-8ef2-a0428414e9db" RevisionId="2622a26d-297d-4017-9079-e942319ca707" Stencil="172d6d98-e5c9-42e9-a209-79f7a94bbd38" StencilRevisionId="00000000-0000-0000-0000-000000000000" StencilVersion="0.0"/>
 </Control>
 </file>
 
 <file path=customXml/item7.xml><?xml version="1.0" encoding="utf-8"?>
 <Control xmlns="http://schemas.microsoft.com/VisualStudio/2011/storyboarding/control">
-  <Id Name="System.Storyboarding.WindowsAppIcons.Calculator" Revision="1" Stencil="System.Storyboarding.WindowsAppIcons" StencilVersion="0.1"/>
+  <Id Name="System.Storyboarding.Common.Text" Revision="1" Stencil="System.Storyboarding.Common" StencilVersion="0.1"/>
 </Control>
 </file>
 
@@ -14440,11 +14440,139 @@
 
 <file path=customXml/item9.xml><?xml version="1.0" encoding="utf-8"?>
 <Control xmlns="http://schemas.microsoft.com/VisualStudio/2011/storyboarding/control">
-  <Id Name="System.Storyboarding.Common.Text" Revision="1" Stencil="System.Storyboarding.Common" StencilVersion="0.1"/>
+  <Id Name="System.Storyboarding.WindowsApps.WindowsAppsToggleOn" Revision="1" Stencil="System.Storyboarding.WindowsApps" StencilVersion="0.1"/>
 </Control>
 </file>
 
 <file path=customXml/itemProps1.xml><?xml version="1.0" encoding="utf-8"?>
+<ds:datastoreItem xmlns:ds="http://schemas.openxmlformats.org/officeDocument/2006/customXml" ds:itemID="{A7EB2591-C851-4B19-B1F0-F52DEFA579ED}">
+  <ds:schemaRefs>
+    <ds:schemaRef ds:uri="http://schemas.microsoft.com/VisualStudio/2011/storyboarding/control"/>
+  </ds:schemaRefs>
+</ds:datastoreItem>
+</file>
+
+<file path=customXml/itemProps10.xml><?xml version="1.0" encoding="utf-8"?>
+<ds:datastoreItem xmlns:ds="http://schemas.openxmlformats.org/officeDocument/2006/customXml" ds:itemID="{C9652ABF-57CE-475D-A27A-579A1DFED925}">
+  <ds:schemaRefs>
+    <ds:schemaRef ds:uri="http://schemas.microsoft.com/VisualStudio/2011/storyboarding/control"/>
+  </ds:schemaRefs>
+</ds:datastoreItem>
+</file>
+
+<file path=customXml/itemProps11.xml><?xml version="1.0" encoding="utf-8"?>
+<ds:datastoreItem xmlns:ds="http://schemas.openxmlformats.org/officeDocument/2006/customXml" ds:itemID="{8FDD7F13-178D-4BAB-A308-4B0022F93AB0}">
+  <ds:schemaRefs>
+    <ds:schemaRef ds:uri="http://schemas.microsoft.com/VisualStudio/2011/storyboarding/control"/>
+  </ds:schemaRefs>
+</ds:datastoreItem>
+</file>
+
+<file path=customXml/itemProps12.xml><?xml version="1.0" encoding="utf-8"?>
+<ds:datastoreItem xmlns:ds="http://schemas.openxmlformats.org/officeDocument/2006/customXml" ds:itemID="{AC25CCEE-71DD-4D3D-9829-5DFE29AACC0A}">
+  <ds:schemaRefs>
+    <ds:schemaRef ds:uri="http://schemas.microsoft.com/VisualStudio/2011/storyboarding/control"/>
+  </ds:schemaRefs>
+</ds:datastoreItem>
+</file>
+
+<file path=customXml/itemProps13.xml><?xml version="1.0" encoding="utf-8"?>
+<ds:datastoreItem xmlns:ds="http://schemas.openxmlformats.org/officeDocument/2006/customXml" ds:itemID="{F565CBF3-6403-4B1A-83ED-D36BC342AE39}">
+  <ds:schemaRefs>
+    <ds:schemaRef ds:uri="http://schemas.microsoft.com/VisualStudio/2011/storyboarding/control"/>
+  </ds:schemaRefs>
+</ds:datastoreItem>
+</file>
+
+<file path=customXml/itemProps14.xml><?xml version="1.0" encoding="utf-8"?>
+<ds:datastoreItem xmlns:ds="http://schemas.openxmlformats.org/officeDocument/2006/customXml" ds:itemID="{D9DDA3D3-FB48-46F6-A80C-F908BCDD2882}">
+  <ds:schemaRefs>
+    <ds:schemaRef ds:uri="http://schemas.microsoft.com/VisualStudio/2011/storyboarding/control"/>
+  </ds:schemaRefs>
+</ds:datastoreItem>
+</file>
+
+<file path=customXml/itemProps15.xml><?xml version="1.0" encoding="utf-8"?>
+<ds:datastoreItem xmlns:ds="http://schemas.openxmlformats.org/officeDocument/2006/customXml" ds:itemID="{4CC681AB-E81B-49FF-87AD-DA604FB5E770}">
+  <ds:schemaRefs>
+    <ds:schemaRef ds:uri="http://schemas.microsoft.com/VisualStudio/2011/storyboarding/control"/>
+  </ds:schemaRefs>
+</ds:datastoreItem>
+</file>
+
+<file path=customXml/itemProps16.xml><?xml version="1.0" encoding="utf-8"?>
+<ds:datastoreItem xmlns:ds="http://schemas.openxmlformats.org/officeDocument/2006/customXml" ds:itemID="{50F30959-BAC2-416F-AB82-32EFF38D6AF6}">
+  <ds:schemaRefs>
+    <ds:schemaRef ds:uri="http://schemas.microsoft.com/VisualStudio/2011/storyboarding/control"/>
+  </ds:schemaRefs>
+</ds:datastoreItem>
+</file>
+
+<file path=customXml/itemProps17.xml><?xml version="1.0" encoding="utf-8"?>
+<ds:datastoreItem xmlns:ds="http://schemas.openxmlformats.org/officeDocument/2006/customXml" ds:itemID="{5F7670CA-BBEF-40DB-9873-251D551B16CB}">
+  <ds:schemaRefs>
+    <ds:schemaRef ds:uri="http://schemas.microsoft.com/VisualStudio/2011/storyboarding/control"/>
+  </ds:schemaRefs>
+</ds:datastoreItem>
+</file>
+
+<file path=customXml/itemProps18.xml><?xml version="1.0" encoding="utf-8"?>
+<ds:datastoreItem xmlns:ds="http://schemas.openxmlformats.org/officeDocument/2006/customXml" ds:itemID="{01E843EA-05B5-487E-B150-D65D4AB22451}">
+  <ds:schemaRefs>
+    <ds:schemaRef ds:uri="http://schemas.microsoft.com/VisualStudio/2011/storyboarding/control"/>
+  </ds:schemaRefs>
+</ds:datastoreItem>
+</file>
+
+<file path=customXml/itemProps19.xml><?xml version="1.0" encoding="utf-8"?>
+<ds:datastoreItem xmlns:ds="http://schemas.openxmlformats.org/officeDocument/2006/customXml" ds:itemID="{04488F9B-6AC9-4224-BF1E-1EA614104287}">
+  <ds:schemaRefs>
+    <ds:schemaRef ds:uri="http://schemas.microsoft.com/VisualStudio/2011/storyboarding/control"/>
+  </ds:schemaRefs>
+</ds:datastoreItem>
+</file>
+
+<file path=customXml/itemProps2.xml><?xml version="1.0" encoding="utf-8"?>
+<ds:datastoreItem xmlns:ds="http://schemas.openxmlformats.org/officeDocument/2006/customXml" ds:itemID="{3B187B4E-20AF-433F-AF65-2480F34D98BD}">
+  <ds:schemaRefs>
+    <ds:schemaRef ds:uri="http://schemas.microsoft.com/VisualStudio/2011/storyboarding/control"/>
+  </ds:schemaRefs>
+</ds:datastoreItem>
+</file>
+
+<file path=customXml/itemProps20.xml><?xml version="1.0" encoding="utf-8"?>
+<ds:datastoreItem xmlns:ds="http://schemas.openxmlformats.org/officeDocument/2006/customXml" ds:itemID="{3657D89A-4777-4684-8123-0BA91C3F7FFC}">
+  <ds:schemaRefs>
+    <ds:schemaRef ds:uri="http://schemas.microsoft.com/VisualStudio/2011/storyboarding/control"/>
+  </ds:schemaRefs>
+</ds:datastoreItem>
+</file>
+
+<file path=customXml/itemProps21.xml><?xml version="1.0" encoding="utf-8"?>
+<ds:datastoreItem xmlns:ds="http://schemas.openxmlformats.org/officeDocument/2006/customXml" ds:itemID="{BDF2BFF0-33CB-449E-B968-4E265E4446A8}">
+  <ds:schemaRefs>
+    <ds:schemaRef ds:uri="http://schemas.microsoft.com/VisualStudio/2011/storyboarding/control"/>
+  </ds:schemaRefs>
+</ds:datastoreItem>
+</file>
+
+<file path=customXml/itemProps22.xml><?xml version="1.0" encoding="utf-8"?>
+<ds:datastoreItem xmlns:ds="http://schemas.openxmlformats.org/officeDocument/2006/customXml" ds:itemID="{A767E187-9CD9-4990-A3CA-29A00E20D7A9}">
+  <ds:schemaRefs>
+    <ds:schemaRef ds:uri="http://schemas.microsoft.com/VisualStudio/2011/storyboarding/control"/>
+  </ds:schemaRefs>
+</ds:datastoreItem>
+</file>
+
+<file path=customXml/itemProps3.xml><?xml version="1.0" encoding="utf-8"?>
+<ds:datastoreItem xmlns:ds="http://schemas.openxmlformats.org/officeDocument/2006/customXml" ds:itemID="{4072FC78-C9FC-4C4E-85A9-F16785908D43}">
+  <ds:schemaRefs>
+    <ds:schemaRef ds:uri="http://schemas.microsoft.com/VisualStudio/2011/storyboarding/control"/>
+  </ds:schemaRefs>
+</ds:datastoreItem>
+</file>
+
+<file path=customXml/itemProps4.xml><?xml version="1.0" encoding="utf-8"?>
 <ds:datastoreItem xmlns:ds="http://schemas.openxmlformats.org/officeDocument/2006/customXml" ds:itemID="{C296643C-92AE-41FE-8885-EAF85992CA40}">
   <ds:schemaRefs>
     <ds:schemaRef ds:uri="http://schemas.microsoft.com/VisualStudio/2011/storyboarding/control"/>
@@ -14452,15 +14580,15 @@
 </ds:datastoreItem>
 </file>
 
-<file path=customXml/itemProps10.xml><?xml version="1.0" encoding="utf-8"?>
-<ds:datastoreItem xmlns:ds="http://schemas.openxmlformats.org/officeDocument/2006/customXml" ds:itemID="{A4765825-82ED-4C73-81E6-6452D372BB14}">
+<file path=customXml/itemProps5.xml><?xml version="1.0" encoding="utf-8"?>
+<ds:datastoreItem xmlns:ds="http://schemas.openxmlformats.org/officeDocument/2006/customXml" ds:itemID="{BE363CCC-B9DB-4675-BC87-2B95573AB357}">
   <ds:schemaRefs>
     <ds:schemaRef ds:uri="http://schemas.microsoft.com/VisualStudio/2011/storyboarding/control"/>
   </ds:schemaRefs>
 </ds:datastoreItem>
 </file>
 
-<file path=customXml/itemProps11.xml><?xml version="1.0" encoding="utf-8"?>
+<file path=customXml/itemProps6.xml><?xml version="1.0" encoding="utf-8"?>
 <ds:datastoreItem xmlns:ds="http://schemas.openxmlformats.org/officeDocument/2006/customXml" ds:itemID="{5E5C4FC8-0714-483E-9E05-94307E8F8DC6}">
   <ds:schemaRefs>
     <ds:schemaRef ds:uri="http://schemas.microsoft.com/VisualStudio/2011/storyboarding/control"/>
@@ -14468,31 +14596,15 @@
 </ds:datastoreItem>
 </file>
 
-<file path=customXml/itemProps12.xml><?xml version="1.0" encoding="utf-8"?>
-<ds:datastoreItem xmlns:ds="http://schemas.openxmlformats.org/officeDocument/2006/customXml" ds:itemID="{BDF2BFF0-33CB-449E-B968-4E265E4446A8}">
+<file path=customXml/itemProps7.xml><?xml version="1.0" encoding="utf-8"?>
+<ds:datastoreItem xmlns:ds="http://schemas.openxmlformats.org/officeDocument/2006/customXml" ds:itemID="{8C00B48A-2346-4532-AEC9-0F6C436A3983}">
   <ds:schemaRefs>
     <ds:schemaRef ds:uri="http://schemas.microsoft.com/VisualStudio/2011/storyboarding/control"/>
   </ds:schemaRefs>
 </ds:datastoreItem>
 </file>
 
-<file path=customXml/itemProps13.xml><?xml version="1.0" encoding="utf-8"?>
-<ds:datastoreItem xmlns:ds="http://schemas.openxmlformats.org/officeDocument/2006/customXml" ds:itemID="{50F30959-BAC2-416F-AB82-32EFF38D6AF6}">
-  <ds:schemaRefs>
-    <ds:schemaRef ds:uri="http://schemas.microsoft.com/VisualStudio/2011/storyboarding/control"/>
-  </ds:schemaRefs>
-</ds:datastoreItem>
-</file>
-
-<file path=customXml/itemProps14.xml><?xml version="1.0" encoding="utf-8"?>
-<ds:datastoreItem xmlns:ds="http://schemas.openxmlformats.org/officeDocument/2006/customXml" ds:itemID="{F565CBF3-6403-4B1A-83ED-D36BC342AE39}">
-  <ds:schemaRefs>
-    <ds:schemaRef ds:uri="http://schemas.microsoft.com/VisualStudio/2011/storyboarding/control"/>
-  </ds:schemaRefs>
-</ds:datastoreItem>
-</file>
-
-<file path=customXml/itemProps15.xml><?xml version="1.0" encoding="utf-8"?>
+<file path=customXml/itemProps8.xml><?xml version="1.0" encoding="utf-8"?>
 <ds:datastoreItem xmlns:ds="http://schemas.openxmlformats.org/officeDocument/2006/customXml" ds:itemID="{C22F3DD2-DD2F-4D1B-A381-F645A779A9FD}">
   <ds:schemaRefs>
     <ds:schemaRef ds:uri="http://schemas.microsoft.com/VisualStudio/2011/storyboarding/control"/>
@@ -14500,120 +14612,8 @@
 </ds:datastoreItem>
 </file>
 
-<file path=customXml/itemProps16.xml><?xml version="1.0" encoding="utf-8"?>
-<ds:datastoreItem xmlns:ds="http://schemas.openxmlformats.org/officeDocument/2006/customXml" ds:itemID="{3B187B4E-20AF-433F-AF65-2480F34D98BD}">
-  <ds:schemaRefs>
-    <ds:schemaRef ds:uri="http://schemas.microsoft.com/VisualStudio/2011/storyboarding/control"/>
-  </ds:schemaRefs>
-</ds:datastoreItem>
-</file>
-
-<file path=customXml/itemProps17.xml><?xml version="1.0" encoding="utf-8"?>
-<ds:datastoreItem xmlns:ds="http://schemas.openxmlformats.org/officeDocument/2006/customXml" ds:itemID="{A767E187-9CD9-4990-A3CA-29A00E20D7A9}">
-  <ds:schemaRefs>
-    <ds:schemaRef ds:uri="http://schemas.microsoft.com/VisualStudio/2011/storyboarding/control"/>
-  </ds:schemaRefs>
-</ds:datastoreItem>
-</file>
-
-<file path=customXml/itemProps18.xml><?xml version="1.0" encoding="utf-8"?>
-<ds:datastoreItem xmlns:ds="http://schemas.openxmlformats.org/officeDocument/2006/customXml" ds:itemID="{5F7670CA-BBEF-40DB-9873-251D551B16CB}">
-  <ds:schemaRefs>
-    <ds:schemaRef ds:uri="http://schemas.microsoft.com/VisualStudio/2011/storyboarding/control"/>
-  </ds:schemaRefs>
-</ds:datastoreItem>
-</file>
-
-<file path=customXml/itemProps19.xml><?xml version="1.0" encoding="utf-8"?>
-<ds:datastoreItem xmlns:ds="http://schemas.openxmlformats.org/officeDocument/2006/customXml" ds:itemID="{C9652ABF-57CE-475D-A27A-579A1DFED925}">
-  <ds:schemaRefs>
-    <ds:schemaRef ds:uri="http://schemas.microsoft.com/VisualStudio/2011/storyboarding/control"/>
-  </ds:schemaRefs>
-</ds:datastoreItem>
-</file>
-
-<file path=customXml/itemProps2.xml><?xml version="1.0" encoding="utf-8"?>
-<ds:datastoreItem xmlns:ds="http://schemas.openxmlformats.org/officeDocument/2006/customXml" ds:itemID="{A7EB2591-C851-4B19-B1F0-F52DEFA579ED}">
-  <ds:schemaRefs>
-    <ds:schemaRef ds:uri="http://schemas.microsoft.com/VisualStudio/2011/storyboarding/control"/>
-  </ds:schemaRefs>
-</ds:datastoreItem>
-</file>
-
-<file path=customXml/itemProps20.xml><?xml version="1.0" encoding="utf-8"?>
-<ds:datastoreItem xmlns:ds="http://schemas.openxmlformats.org/officeDocument/2006/customXml" ds:itemID="{4072FC78-C9FC-4C4E-85A9-F16785908D43}">
-  <ds:schemaRefs>
-    <ds:schemaRef ds:uri="http://schemas.microsoft.com/VisualStudio/2011/storyboarding/control"/>
-  </ds:schemaRefs>
-</ds:datastoreItem>
-</file>
-
-<file path=customXml/itemProps21.xml><?xml version="1.0" encoding="utf-8"?>
-<ds:datastoreItem xmlns:ds="http://schemas.openxmlformats.org/officeDocument/2006/customXml" ds:itemID="{04488F9B-6AC9-4224-BF1E-1EA614104287}">
-  <ds:schemaRefs>
-    <ds:schemaRef ds:uri="http://schemas.microsoft.com/VisualStudio/2011/storyboarding/control"/>
-  </ds:schemaRefs>
-</ds:datastoreItem>
-</file>
-
-<file path=customXml/itemProps22.xml><?xml version="1.0" encoding="utf-8"?>
-<ds:datastoreItem xmlns:ds="http://schemas.openxmlformats.org/officeDocument/2006/customXml" ds:itemID="{D9DDA3D3-FB48-46F6-A80C-F908BCDD2882}">
-  <ds:schemaRefs>
-    <ds:schemaRef ds:uri="http://schemas.microsoft.com/VisualStudio/2011/storyboarding/control"/>
-  </ds:schemaRefs>
-</ds:datastoreItem>
-</file>
-
-<file path=customXml/itemProps3.xml><?xml version="1.0" encoding="utf-8"?>
-<ds:datastoreItem xmlns:ds="http://schemas.openxmlformats.org/officeDocument/2006/customXml" ds:itemID="{01E843EA-05B5-487E-B150-D65D4AB22451}">
-  <ds:schemaRefs>
-    <ds:schemaRef ds:uri="http://schemas.microsoft.com/VisualStudio/2011/storyboarding/control"/>
-  </ds:schemaRefs>
-</ds:datastoreItem>
-</file>
-
-<file path=customXml/itemProps4.xml><?xml version="1.0" encoding="utf-8"?>
-<ds:datastoreItem xmlns:ds="http://schemas.openxmlformats.org/officeDocument/2006/customXml" ds:itemID="{8FDD7F13-178D-4BAB-A308-4B0022F93AB0}">
-  <ds:schemaRefs>
-    <ds:schemaRef ds:uri="http://schemas.microsoft.com/VisualStudio/2011/storyboarding/control"/>
-  </ds:schemaRefs>
-</ds:datastoreItem>
-</file>
-
-<file path=customXml/itemProps5.xml><?xml version="1.0" encoding="utf-8"?>
-<ds:datastoreItem xmlns:ds="http://schemas.openxmlformats.org/officeDocument/2006/customXml" ds:itemID="{8C00B48A-2346-4532-AEC9-0F6C436A3983}">
-  <ds:schemaRefs>
-    <ds:schemaRef ds:uri="http://schemas.microsoft.com/VisualStudio/2011/storyboarding/control"/>
-  </ds:schemaRefs>
-</ds:datastoreItem>
-</file>
-
-<file path=customXml/itemProps6.xml><?xml version="1.0" encoding="utf-8"?>
-<ds:datastoreItem xmlns:ds="http://schemas.openxmlformats.org/officeDocument/2006/customXml" ds:itemID="{BE363CCC-B9DB-4675-BC87-2B95573AB357}">
-  <ds:schemaRefs>
-    <ds:schemaRef ds:uri="http://schemas.microsoft.com/VisualStudio/2011/storyboarding/control"/>
-  </ds:schemaRefs>
-</ds:datastoreItem>
-</file>
-
-<file path=customXml/itemProps7.xml><?xml version="1.0" encoding="utf-8"?>
-<ds:datastoreItem xmlns:ds="http://schemas.openxmlformats.org/officeDocument/2006/customXml" ds:itemID="{3657D89A-4777-4684-8123-0BA91C3F7FFC}">
-  <ds:schemaRefs>
-    <ds:schemaRef ds:uri="http://schemas.microsoft.com/VisualStudio/2011/storyboarding/control"/>
-  </ds:schemaRefs>
-</ds:datastoreItem>
-</file>
-
-<file path=customXml/itemProps8.xml><?xml version="1.0" encoding="utf-8"?>
-<ds:datastoreItem xmlns:ds="http://schemas.openxmlformats.org/officeDocument/2006/customXml" ds:itemID="{4CC681AB-E81B-49FF-87AD-DA604FB5E770}">
-  <ds:schemaRefs>
-    <ds:schemaRef ds:uri="http://schemas.microsoft.com/VisualStudio/2011/storyboarding/control"/>
-  </ds:schemaRefs>
-</ds:datastoreItem>
-</file>
-
 <file path=customXml/itemProps9.xml><?xml version="1.0" encoding="utf-8"?>
-<ds:datastoreItem xmlns:ds="http://schemas.openxmlformats.org/officeDocument/2006/customXml" ds:itemID="{AC25CCEE-71DD-4D3D-9829-5DFE29AACC0A}">
+<ds:datastoreItem xmlns:ds="http://schemas.openxmlformats.org/officeDocument/2006/customXml" ds:itemID="{A4765825-82ED-4C73-81E6-6452D372BB14}">
   <ds:schemaRefs>
     <ds:schemaRef ds:uri="http://schemas.microsoft.com/VisualStudio/2011/storyboarding/control"/>
   </ds:schemaRefs>

</xml_diff>